<commit_message>
Add drink function and design
</commit_message>
<xml_diff>
--- a/Design.pptx
+++ b/Design.pptx
@@ -289,7 +289,7 @@
           <a:p>
             <a:fld id="{F029B8A0-2010-D049-9C6F-80F523004025}" type="datetimeFigureOut">
               <a:rPr lang="fr-FR" smtClean="0"/>
-              <a:t>24/12/15</a:t>
+              <a:t>06/02/16</a:t>
             </a:fld>
             <a:endParaRPr lang="fr-FR"/>
           </a:p>
@@ -459,7 +459,7 @@
           <a:p>
             <a:fld id="{F029B8A0-2010-D049-9C6F-80F523004025}" type="datetimeFigureOut">
               <a:rPr lang="fr-FR" smtClean="0"/>
-              <a:t>24/12/15</a:t>
+              <a:t>06/02/16</a:t>
             </a:fld>
             <a:endParaRPr lang="fr-FR"/>
           </a:p>
@@ -639,7 +639,7 @@
           <a:p>
             <a:fld id="{F029B8A0-2010-D049-9C6F-80F523004025}" type="datetimeFigureOut">
               <a:rPr lang="fr-FR" smtClean="0"/>
-              <a:t>24/12/15</a:t>
+              <a:t>06/02/16</a:t>
             </a:fld>
             <a:endParaRPr lang="fr-FR"/>
           </a:p>
@@ -809,7 +809,7 @@
           <a:p>
             <a:fld id="{F029B8A0-2010-D049-9C6F-80F523004025}" type="datetimeFigureOut">
               <a:rPr lang="fr-FR" smtClean="0"/>
-              <a:t>24/12/15</a:t>
+              <a:t>06/02/16</a:t>
             </a:fld>
             <a:endParaRPr lang="fr-FR"/>
           </a:p>
@@ -1055,7 +1055,7 @@
           <a:p>
             <a:fld id="{F029B8A0-2010-D049-9C6F-80F523004025}" type="datetimeFigureOut">
               <a:rPr lang="fr-FR" smtClean="0"/>
-              <a:t>24/12/15</a:t>
+              <a:t>06/02/16</a:t>
             </a:fld>
             <a:endParaRPr lang="fr-FR"/>
           </a:p>
@@ -1343,7 +1343,7 @@
           <a:p>
             <a:fld id="{F029B8A0-2010-D049-9C6F-80F523004025}" type="datetimeFigureOut">
               <a:rPr lang="fr-FR" smtClean="0"/>
-              <a:t>24/12/15</a:t>
+              <a:t>06/02/16</a:t>
             </a:fld>
             <a:endParaRPr lang="fr-FR"/>
           </a:p>
@@ -1765,7 +1765,7 @@
           <a:p>
             <a:fld id="{F029B8A0-2010-D049-9C6F-80F523004025}" type="datetimeFigureOut">
               <a:rPr lang="fr-FR" smtClean="0"/>
-              <a:t>24/12/15</a:t>
+              <a:t>06/02/16</a:t>
             </a:fld>
             <a:endParaRPr lang="fr-FR"/>
           </a:p>
@@ -1883,7 +1883,7 @@
           <a:p>
             <a:fld id="{F029B8A0-2010-D049-9C6F-80F523004025}" type="datetimeFigureOut">
               <a:rPr lang="fr-FR" smtClean="0"/>
-              <a:t>24/12/15</a:t>
+              <a:t>06/02/16</a:t>
             </a:fld>
             <a:endParaRPr lang="fr-FR"/>
           </a:p>
@@ -1978,7 +1978,7 @@
           <a:p>
             <a:fld id="{F029B8A0-2010-D049-9C6F-80F523004025}" type="datetimeFigureOut">
               <a:rPr lang="fr-FR" smtClean="0"/>
-              <a:t>24/12/15</a:t>
+              <a:t>06/02/16</a:t>
             </a:fld>
             <a:endParaRPr lang="fr-FR"/>
           </a:p>
@@ -2255,7 +2255,7 @@
           <a:p>
             <a:fld id="{F029B8A0-2010-D049-9C6F-80F523004025}" type="datetimeFigureOut">
               <a:rPr lang="fr-FR" smtClean="0"/>
-              <a:t>24/12/15</a:t>
+              <a:t>06/02/16</a:t>
             </a:fld>
             <a:endParaRPr lang="fr-FR"/>
           </a:p>
@@ -2508,7 +2508,7 @@
           <a:p>
             <a:fld id="{F029B8A0-2010-D049-9C6F-80F523004025}" type="datetimeFigureOut">
               <a:rPr lang="fr-FR" smtClean="0"/>
-              <a:t>24/12/15</a:t>
+              <a:t>06/02/16</a:t>
             </a:fld>
             <a:endParaRPr lang="fr-FR"/>
           </a:p>
@@ -2721,7 +2721,7 @@
           <a:p>
             <a:fld id="{F029B8A0-2010-D049-9C6F-80F523004025}" type="datetimeFigureOut">
               <a:rPr lang="fr-FR" smtClean="0"/>
-              <a:t>24/12/15</a:t>
+              <a:t>06/02/16</a:t>
             </a:fld>
             <a:endParaRPr lang="fr-FR"/>
           </a:p>
@@ -5289,6 +5289,30 @@
           </p:spPr>
         </p:pic>
       </p:grpSp>
+      <p:pic>
+        <p:nvPicPr>
+          <p:cNvPr id="42" name="Image 41"/>
+          <p:cNvPicPr>
+            <a:picLocks noChangeAspect="1"/>
+          </p:cNvPicPr>
+          <p:nvPr/>
+        </p:nvPicPr>
+        <p:blipFill>
+          <a:blip r:embed="rId4"/>
+          <a:stretch>
+            <a:fillRect/>
+          </a:stretch>
+        </p:blipFill>
+        <p:spPr>
+          <a:xfrm>
+            <a:off x="3336311" y="4126241"/>
+            <a:ext cx="1630752" cy="1630752"/>
+          </a:xfrm>
+          <a:prstGeom prst="rect">
+            <a:avLst/>
+          </a:prstGeom>
+        </p:spPr>
+      </p:pic>
     </p:spTree>
     <p:extLst>
       <p:ext uri="{BB962C8B-B14F-4D97-AF65-F5344CB8AC3E}">

</xml_diff>